<commit_message>
Fixed `optionalAdd` on slide 33. PowerPoint is not the best IDE. Thanks Mark.
</commit_message>
<xml_diff>
--- a/slides/FEC-4-TypeScript.pptx
+++ b/slides/FEC-4-TypeScript.pptx
@@ -249,7 +249,7 @@
           <a:p>
             <a:fld id="{C987BB99-8E6F-244B-B613-8C7940A90FCA}" type="datetimeFigureOut">
               <a:rPr lang="en-US" smtClean="0"/>
-              <a:t>10/8/19</a:t>
+              <a:t>10/16/19</a:t>
             </a:fld>
             <a:endParaRPr lang="en-US"/>
           </a:p>
@@ -3413,6 +3413,41 @@
           <a:bodyPr/>
           <a:lstStyle/>
           <a:p>
+            <a:pPr marL="0" marR="0" lvl="0" indent="0" algn="l" defTabSz="457200" rtl="0" eaLnBrk="1" fontAlgn="auto" latinLnBrk="0" hangingPunct="1">
+              <a:lnSpc>
+                <a:spcPct val="100000"/>
+              </a:lnSpc>
+              <a:spcBef>
+                <a:spcPts val="0"/>
+              </a:spcBef>
+              <a:spcAft>
+                <a:spcPts val="0"/>
+              </a:spcAft>
+              <a:buClrTx/>
+              <a:buSzTx/>
+              <a:buFontTx/>
+              <a:buNone/>
+              <a:tabLst/>
+              <a:defRPr/>
+            </a:pPr>
+            <a:r>
+              <a:rPr lang="en-US" dirty="0"/>
+              <a:t>T</a:t>
+            </a:r>
+            <a:r>
+              <a:rPr lang="en-US" sz="1200" b="0" i="0" u="none" strike="noStrike" kern="1200" dirty="0">
+                <a:solidFill>
+                  <a:schemeClr val="tx1"/>
+                </a:solidFill>
+                <a:effectLst/>
+                <a:latin typeface="+mn-lt"/>
+                <a:ea typeface="+mn-ea"/>
+                <a:cs typeface="+mn-cs"/>
+              </a:rPr>
+              <a:t>imeout doesn't matter because items only get taken off the queue after main method finishes</a:t>
+            </a:r>
+          </a:p>
+          <a:p>
             <a:endParaRPr lang="en-US" dirty="0"/>
           </a:p>
         </p:txBody>
@@ -3716,7 +3751,7 @@
           <a:p>
             <a:fld id="{A9A7C94D-0F08-E24F-9B6F-B061E2A88D5D}" type="datetimeFigureOut">
               <a:rPr lang="en-US" smtClean="0"/>
-              <a:t>10/8/19</a:t>
+              <a:t>10/16/19</a:t>
             </a:fld>
             <a:endParaRPr lang="en-US"/>
           </a:p>
@@ -3884,7 +3919,7 @@
           <a:p>
             <a:fld id="{A9A7C94D-0F08-E24F-9B6F-B061E2A88D5D}" type="datetimeFigureOut">
               <a:rPr lang="en-US" smtClean="0"/>
-              <a:t>10/8/19</a:t>
+              <a:t>10/16/19</a:t>
             </a:fld>
             <a:endParaRPr lang="en-US"/>
           </a:p>
@@ -4062,7 +4097,7 @@
           <a:p>
             <a:fld id="{A9A7C94D-0F08-E24F-9B6F-B061E2A88D5D}" type="datetimeFigureOut">
               <a:rPr lang="en-US" smtClean="0"/>
-              <a:t>10/8/19</a:t>
+              <a:t>10/16/19</a:t>
             </a:fld>
             <a:endParaRPr lang="en-US"/>
           </a:p>
@@ -4302,7 +4337,7 @@
           <a:p>
             <a:fld id="{FD512F03-9A2D-1F4E-BE35-954CDFF91FA2}" type="datetimeFigureOut">
               <a:rPr lang="en-US" smtClean="0"/>
-              <a:t>10/8/19</a:t>
+              <a:t>10/16/19</a:t>
             </a:fld>
             <a:endParaRPr lang="en-US"/>
           </a:p>
@@ -4470,7 +4505,7 @@
           <a:p>
             <a:fld id="{FD512F03-9A2D-1F4E-BE35-954CDFF91FA2}" type="datetimeFigureOut">
               <a:rPr lang="en-US" smtClean="0"/>
-              <a:t>10/8/19</a:t>
+              <a:t>10/16/19</a:t>
             </a:fld>
             <a:endParaRPr lang="en-US"/>
           </a:p>
@@ -4715,7 +4750,7 @@
           <a:p>
             <a:fld id="{FD512F03-9A2D-1F4E-BE35-954CDFF91FA2}" type="datetimeFigureOut">
               <a:rPr lang="en-US" smtClean="0"/>
-              <a:t>10/8/19</a:t>
+              <a:t>10/16/19</a:t>
             </a:fld>
             <a:endParaRPr lang="en-US"/>
           </a:p>
@@ -5000,7 +5035,7 @@
           <a:p>
             <a:fld id="{FD512F03-9A2D-1F4E-BE35-954CDFF91FA2}" type="datetimeFigureOut">
               <a:rPr lang="en-US" smtClean="0"/>
-              <a:t>10/8/19</a:t>
+              <a:t>10/16/19</a:t>
             </a:fld>
             <a:endParaRPr lang="en-US"/>
           </a:p>
@@ -5419,7 +5454,7 @@
           <a:p>
             <a:fld id="{FD512F03-9A2D-1F4E-BE35-954CDFF91FA2}" type="datetimeFigureOut">
               <a:rPr lang="en-US" smtClean="0"/>
-              <a:t>10/8/19</a:t>
+              <a:t>10/16/19</a:t>
             </a:fld>
             <a:endParaRPr lang="en-US"/>
           </a:p>
@@ -5536,7 +5571,7 @@
           <a:p>
             <a:fld id="{FD512F03-9A2D-1F4E-BE35-954CDFF91FA2}" type="datetimeFigureOut">
               <a:rPr lang="en-US" smtClean="0"/>
-              <a:t>10/8/19</a:t>
+              <a:t>10/16/19</a:t>
             </a:fld>
             <a:endParaRPr lang="en-US"/>
           </a:p>
@@ -5631,7 +5666,7 @@
           <a:p>
             <a:fld id="{FD512F03-9A2D-1F4E-BE35-954CDFF91FA2}" type="datetimeFigureOut">
               <a:rPr lang="en-US" smtClean="0"/>
-              <a:t>10/8/19</a:t>
+              <a:t>10/16/19</a:t>
             </a:fld>
             <a:endParaRPr lang="en-US"/>
           </a:p>
@@ -5906,7 +5941,7 @@
           <a:p>
             <a:fld id="{FD512F03-9A2D-1F4E-BE35-954CDFF91FA2}" type="datetimeFigureOut">
               <a:rPr lang="en-US" smtClean="0"/>
-              <a:t>10/8/19</a:t>
+              <a:t>10/16/19</a:t>
             </a:fld>
             <a:endParaRPr lang="en-US"/>
           </a:p>
@@ -6074,7 +6109,7 @@
           <a:p>
             <a:fld id="{A9A7C94D-0F08-E24F-9B6F-B061E2A88D5D}" type="datetimeFigureOut">
               <a:rPr lang="en-US" smtClean="0"/>
-              <a:t>10/8/19</a:t>
+              <a:t>10/16/19</a:t>
             </a:fld>
             <a:endParaRPr lang="en-US"/>
           </a:p>
@@ -6326,7 +6361,7 @@
           <a:p>
             <a:fld id="{FD512F03-9A2D-1F4E-BE35-954CDFF91FA2}" type="datetimeFigureOut">
               <a:rPr lang="en-US" smtClean="0"/>
-              <a:t>10/8/19</a:t>
+              <a:t>10/16/19</a:t>
             </a:fld>
             <a:endParaRPr lang="en-US"/>
           </a:p>
@@ -6494,7 +6529,7 @@
           <a:p>
             <a:fld id="{FD512F03-9A2D-1F4E-BE35-954CDFF91FA2}" type="datetimeFigureOut">
               <a:rPr lang="en-US" smtClean="0"/>
-              <a:t>10/8/19</a:t>
+              <a:t>10/16/19</a:t>
             </a:fld>
             <a:endParaRPr lang="en-US"/>
           </a:p>
@@ -6672,7 +6707,7 @@
           <a:p>
             <a:fld id="{FD512F03-9A2D-1F4E-BE35-954CDFF91FA2}" type="datetimeFigureOut">
               <a:rPr lang="en-US" smtClean="0"/>
-              <a:t>10/8/19</a:t>
+              <a:t>10/16/19</a:t>
             </a:fld>
             <a:endParaRPr lang="en-US"/>
           </a:p>
@@ -6917,7 +6952,7 @@
           <a:p>
             <a:fld id="{A9A7C94D-0F08-E24F-9B6F-B061E2A88D5D}" type="datetimeFigureOut">
               <a:rPr lang="en-US" smtClean="0"/>
-              <a:t>10/8/19</a:t>
+              <a:t>10/16/19</a:t>
             </a:fld>
             <a:endParaRPr lang="en-US"/>
           </a:p>
@@ -7202,7 +7237,7 @@
           <a:p>
             <a:fld id="{A9A7C94D-0F08-E24F-9B6F-B061E2A88D5D}" type="datetimeFigureOut">
               <a:rPr lang="en-US" smtClean="0"/>
-              <a:t>10/8/19</a:t>
+              <a:t>10/16/19</a:t>
             </a:fld>
             <a:endParaRPr lang="en-US"/>
           </a:p>
@@ -7621,7 +7656,7 @@
           <a:p>
             <a:fld id="{A9A7C94D-0F08-E24F-9B6F-B061E2A88D5D}" type="datetimeFigureOut">
               <a:rPr lang="en-US" smtClean="0"/>
-              <a:t>10/8/19</a:t>
+              <a:t>10/16/19</a:t>
             </a:fld>
             <a:endParaRPr lang="en-US"/>
           </a:p>
@@ -7738,7 +7773,7 @@
           <a:p>
             <a:fld id="{A9A7C94D-0F08-E24F-9B6F-B061E2A88D5D}" type="datetimeFigureOut">
               <a:rPr lang="en-US" smtClean="0"/>
-              <a:t>10/8/19</a:t>
+              <a:t>10/16/19</a:t>
             </a:fld>
             <a:endParaRPr lang="en-US"/>
           </a:p>
@@ -7833,7 +7868,7 @@
           <a:p>
             <a:fld id="{A9A7C94D-0F08-E24F-9B6F-B061E2A88D5D}" type="datetimeFigureOut">
               <a:rPr lang="en-US" smtClean="0"/>
-              <a:t>10/8/19</a:t>
+              <a:t>10/16/19</a:t>
             </a:fld>
             <a:endParaRPr lang="en-US"/>
           </a:p>
@@ -8108,7 +8143,7 @@
           <a:p>
             <a:fld id="{A9A7C94D-0F08-E24F-9B6F-B061E2A88D5D}" type="datetimeFigureOut">
               <a:rPr lang="en-US" smtClean="0"/>
-              <a:t>10/8/19</a:t>
+              <a:t>10/16/19</a:t>
             </a:fld>
             <a:endParaRPr lang="en-US"/>
           </a:p>
@@ -8360,7 +8395,7 @@
           <a:p>
             <a:fld id="{A9A7C94D-0F08-E24F-9B6F-B061E2A88D5D}" type="datetimeFigureOut">
               <a:rPr lang="en-US" smtClean="0"/>
-              <a:t>10/8/19</a:t>
+              <a:t>10/16/19</a:t>
             </a:fld>
             <a:endParaRPr lang="en-US"/>
           </a:p>
@@ -8583,7 +8618,7 @@
           <a:p>
             <a:fld id="{A9A7C94D-0F08-E24F-9B6F-B061E2A88D5D}" type="datetimeFigureOut">
               <a:rPr lang="en-US" smtClean="0"/>
-              <a:t>10/8/19</a:t>
+              <a:t>10/16/19</a:t>
             </a:fld>
             <a:endParaRPr lang="en-US"/>
           </a:p>
@@ -9091,7 +9126,7 @@
           <a:p>
             <a:fld id="{FD512F03-9A2D-1F4E-BE35-954CDFF91FA2}" type="datetimeFigureOut">
               <a:rPr lang="en-US" smtClean="0"/>
-              <a:t>10/8/19</a:t>
+              <a:t>10/16/19</a:t>
             </a:fld>
             <a:endParaRPr lang="en-US"/>
           </a:p>
@@ -28909,7 +28944,22 @@
               <a:rPr lang="en-US" sz="1600" dirty="0">
                 <a:latin typeface="Courier" pitchFamily="2" charset="0"/>
               </a:rPr>
-              <a:t>(!y) {</a:t>
+              <a:t>(y === </a:t>
+            </a:r>
+            <a:r>
+              <a:rPr lang="en-US" sz="1600" dirty="0">
+                <a:solidFill>
+                  <a:srgbClr val="1600FF"/>
+                </a:solidFill>
+                <a:latin typeface="Courier" pitchFamily="2" charset="0"/>
+              </a:rPr>
+              <a:t>undefined</a:t>
+            </a:r>
+            <a:r>
+              <a:rPr lang="en-US" sz="1600" dirty="0">
+                <a:latin typeface="Courier" pitchFamily="2" charset="0"/>
+              </a:rPr>
+              <a:t>) {</a:t>
             </a:r>
             <a:br>
               <a:rPr lang="en-US" sz="1600" dirty="0">

</xml_diff>